<commit_message>
Usuario publico -> CU4
</commit_message>
<xml_diff>
--- a/Presentacion.pptx
+++ b/Presentacion.pptx
@@ -259,7 +259,7 @@
             <a:fld id="{7A847CFC-816F-41D0-AAC0-9BF4FEBC753E}" type="datetimeFigureOut">
               <a:rPr lang="es-ES" smtClean="0"/>
               <a:pPr/>
-              <a:t>05/10/2014</a:t>
+              <a:t>08/10/2014</a:t>
             </a:fld>
             <a:endParaRPr lang="es-ES"/>
           </a:p>
@@ -1130,7 +1130,7 @@
             <a:fld id="{7A847CFC-816F-41D0-AAC0-9BF4FEBC753E}" type="datetimeFigureOut">
               <a:rPr lang="es-ES" smtClean="0"/>
               <a:pPr/>
-              <a:t>05/10/2014</a:t>
+              <a:t>08/10/2014</a:t>
             </a:fld>
             <a:endParaRPr lang="es-ES"/>
           </a:p>
@@ -1307,7 +1307,7 @@
             <a:fld id="{7A847CFC-816F-41D0-AAC0-9BF4FEBC753E}" type="datetimeFigureOut">
               <a:rPr lang="es-ES" smtClean="0"/>
               <a:pPr/>
-              <a:t>05/10/2014</a:t>
+              <a:t>08/10/2014</a:t>
             </a:fld>
             <a:endParaRPr lang="es-ES"/>
           </a:p>
@@ -1479,7 +1479,7 @@
             <a:fld id="{7A847CFC-816F-41D0-AAC0-9BF4FEBC753E}" type="datetimeFigureOut">
               <a:rPr lang="es-ES" smtClean="0"/>
               <a:pPr/>
-              <a:t>05/10/2014</a:t>
+              <a:t>08/10/2014</a:t>
             </a:fld>
             <a:endParaRPr lang="es-ES"/>
           </a:p>
@@ -1691,7 +1691,7 @@
             <a:fld id="{7A847CFC-816F-41D0-AAC0-9BF4FEBC753E}" type="datetimeFigureOut">
               <a:rPr lang="es-ES" smtClean="0"/>
               <a:pPr/>
-              <a:t>05/10/2014</a:t>
+              <a:t>08/10/2014</a:t>
             </a:fld>
             <a:endParaRPr lang="es-ES"/>
           </a:p>
@@ -2507,7 +2507,7 @@
             <a:fld id="{7A847CFC-816F-41D0-AAC0-9BF4FEBC753E}" type="datetimeFigureOut">
               <a:rPr lang="es-ES" smtClean="0"/>
               <a:pPr/>
-              <a:t>05/10/2014</a:t>
+              <a:t>08/10/2014</a:t>
             </a:fld>
             <a:endParaRPr lang="es-ES"/>
           </a:p>
@@ -2745,7 +2745,7 @@
             <a:fld id="{7A847CFC-816F-41D0-AAC0-9BF4FEBC753E}" type="datetimeFigureOut">
               <a:rPr lang="es-ES" smtClean="0"/>
               <a:pPr/>
-              <a:t>05/10/2014</a:t>
+              <a:t>08/10/2014</a:t>
             </a:fld>
             <a:endParaRPr lang="es-ES"/>
           </a:p>
@@ -3070,7 +3070,7 @@
             <a:fld id="{7A847CFC-816F-41D0-AAC0-9BF4FEBC753E}" type="datetimeFigureOut">
               <a:rPr lang="es-ES" smtClean="0"/>
               <a:pPr/>
-              <a:t>05/10/2014</a:t>
+              <a:t>08/10/2014</a:t>
             </a:fld>
             <a:endParaRPr lang="es-ES"/>
           </a:p>
@@ -3162,7 +3162,7 @@
             <a:fld id="{7A847CFC-816F-41D0-AAC0-9BF4FEBC753E}" type="datetimeFigureOut">
               <a:rPr lang="es-ES" smtClean="0"/>
               <a:pPr/>
-              <a:t>05/10/2014</a:t>
+              <a:t>08/10/2014</a:t>
             </a:fld>
             <a:endParaRPr lang="es-ES"/>
           </a:p>
@@ -3681,7 +3681,7 @@
             <a:fld id="{7A847CFC-816F-41D0-AAC0-9BF4FEBC753E}" type="datetimeFigureOut">
               <a:rPr lang="es-ES" smtClean="0"/>
               <a:pPr/>
-              <a:t>05/10/2014</a:t>
+              <a:t>08/10/2014</a:t>
             </a:fld>
             <a:endParaRPr lang="es-ES"/>
           </a:p>
@@ -4194,7 +4194,7 @@
             <a:fld id="{7A847CFC-816F-41D0-AAC0-9BF4FEBC753E}" type="datetimeFigureOut">
               <a:rPr lang="es-ES" smtClean="0"/>
               <a:pPr/>
-              <a:t>05/10/2014</a:t>
+              <a:t>08/10/2014</a:t>
             </a:fld>
             <a:endParaRPr lang="es-ES"/>
           </a:p>
@@ -4441,7 +4441,7 @@
             <a:fld id="{7A847CFC-816F-41D0-AAC0-9BF4FEBC753E}" type="datetimeFigureOut">
               <a:rPr lang="es-ES" smtClean="0"/>
               <a:pPr/>
-              <a:t>05/10/2014</a:t>
+              <a:t>08/10/2014</a:t>
             </a:fld>
             <a:endParaRPr lang="es-ES"/>
           </a:p>
@@ -7015,32 +7015,15 @@
           </a:p>
         </p:txBody>
       </p:sp>
-      <p:sp>
-        <p:nvSpPr>
-          <p:cNvPr id="5" name="4 Marcador de contenido"/>
-          <p:cNvSpPr>
-            <a:spLocks noGrp="1"/>
-          </p:cNvSpPr>
-          <p:nvPr>
-            <p:ph sz="quarter" idx="1"/>
-          </p:nvPr>
-        </p:nvSpPr>
-        <p:spPr/>
-        <p:txBody>
-          <a:bodyPr/>
-          <a:lstStyle/>
-          <a:p>
-            <a:endParaRPr lang="es-UY"/>
-          </a:p>
-        </p:txBody>
-      </p:sp>
       <p:pic>
         <p:nvPicPr>
-          <p:cNvPr id="1026" name="Picture 2"/>
+          <p:cNvPr id="3" name="Picture 2"/>
           <p:cNvPicPr>
-            <a:picLocks noChangeAspect="1" noChangeArrowheads="1"/>
+            <a:picLocks noGrp="1" noChangeAspect="1" noChangeArrowheads="1"/>
           </p:cNvPicPr>
-          <p:nvPr/>
+          <p:nvPr>
+            <p:ph sz="quarter" idx="1"/>
+          </p:nvPr>
         </p:nvPicPr>
         <p:blipFill>
           <a:blip r:embed="rId2"/>
@@ -7051,8 +7034,8 @@
         </p:blipFill>
         <p:spPr bwMode="auto">
           <a:xfrm>
-            <a:off x="495049" y="1571611"/>
-            <a:ext cx="7863165" cy="5122971"/>
+            <a:off x="187600" y="1428736"/>
+            <a:ext cx="8313490" cy="5416365"/>
           </a:xfrm>
           <a:prstGeom prst="rect">
             <a:avLst/>

</xml_diff>

<commit_message>
Introducción doc final+propuesta de proy de Raquel+Cambios sugeridos en la presentación
</commit_message>
<xml_diff>
--- a/Presentacion.pptx
+++ b/Presentacion.pptx
@@ -5,7 +5,7 @@
     <p:sldMasterId id="2147483732" r:id="rId1"/>
   </p:sldMasterIdLst>
   <p:notesMasterIdLst>
-    <p:notesMasterId r:id="rId23"/>
+    <p:notesMasterId r:id="rId24"/>
   </p:notesMasterIdLst>
   <p:sldIdLst>
     <p:sldId id="256" r:id="rId2"/>
@@ -17,18 +17,19 @@
     <p:sldId id="271" r:id="rId8"/>
     <p:sldId id="258" r:id="rId9"/>
     <p:sldId id="259" r:id="rId10"/>
-    <p:sldId id="260" r:id="rId11"/>
-    <p:sldId id="270" r:id="rId12"/>
-    <p:sldId id="272" r:id="rId13"/>
-    <p:sldId id="273" r:id="rId14"/>
-    <p:sldId id="274" r:id="rId15"/>
-    <p:sldId id="269" r:id="rId16"/>
-    <p:sldId id="268" r:id="rId17"/>
-    <p:sldId id="261" r:id="rId18"/>
-    <p:sldId id="262" r:id="rId19"/>
-    <p:sldId id="263" r:id="rId20"/>
-    <p:sldId id="275" r:id="rId21"/>
-    <p:sldId id="265" r:id="rId22"/>
+    <p:sldId id="277" r:id="rId11"/>
+    <p:sldId id="260" r:id="rId12"/>
+    <p:sldId id="270" r:id="rId13"/>
+    <p:sldId id="272" r:id="rId14"/>
+    <p:sldId id="273" r:id="rId15"/>
+    <p:sldId id="274" r:id="rId16"/>
+    <p:sldId id="269" r:id="rId17"/>
+    <p:sldId id="268" r:id="rId18"/>
+    <p:sldId id="261" r:id="rId19"/>
+    <p:sldId id="262" r:id="rId20"/>
+    <p:sldId id="263" r:id="rId21"/>
+    <p:sldId id="275" r:id="rId22"/>
+    <p:sldId id="265" r:id="rId23"/>
   </p:sldIdLst>
   <p:sldSz cx="9144000" cy="6858000" type="screen4x3"/>
   <p:notesSz cx="6858000" cy="9144000"/>
@@ -213,7 +214,7 @@
             <a:fld id="{E8BFD649-4464-4874-A030-77DA47E62353}" type="datetimeFigureOut">
               <a:rPr lang="es-UY" smtClean="0"/>
               <a:pPr/>
-              <a:t>14/10/2014</a:t>
+              <a:t>20/10/2014</a:t>
             </a:fld>
             <a:endParaRPr lang="es-UY"/>
           </a:p>
@@ -617,7 +618,7 @@
             <a:fld id="{7A847CFC-816F-41D0-AAC0-9BF4FEBC753E}" type="datetimeFigureOut">
               <a:rPr lang="es-ES" smtClean="0"/>
               <a:pPr/>
-              <a:t>14/10/2014</a:t>
+              <a:t>20/10/2014</a:t>
             </a:fld>
             <a:endParaRPr lang="es-ES"/>
           </a:p>
@@ -1488,7 +1489,7 @@
             <a:fld id="{7A847CFC-816F-41D0-AAC0-9BF4FEBC753E}" type="datetimeFigureOut">
               <a:rPr lang="es-ES" smtClean="0"/>
               <a:pPr/>
-              <a:t>14/10/2014</a:t>
+              <a:t>20/10/2014</a:t>
             </a:fld>
             <a:endParaRPr lang="es-ES"/>
           </a:p>
@@ -1665,7 +1666,7 @@
             <a:fld id="{7A847CFC-816F-41D0-AAC0-9BF4FEBC753E}" type="datetimeFigureOut">
               <a:rPr lang="es-ES" smtClean="0"/>
               <a:pPr/>
-              <a:t>14/10/2014</a:t>
+              <a:t>20/10/2014</a:t>
             </a:fld>
             <a:endParaRPr lang="es-ES"/>
           </a:p>
@@ -1837,7 +1838,7 @@
             <a:fld id="{7A847CFC-816F-41D0-AAC0-9BF4FEBC753E}" type="datetimeFigureOut">
               <a:rPr lang="es-ES" smtClean="0"/>
               <a:pPr/>
-              <a:t>14/10/2014</a:t>
+              <a:t>20/10/2014</a:t>
             </a:fld>
             <a:endParaRPr lang="es-ES"/>
           </a:p>
@@ -2049,7 +2050,7 @@
             <a:fld id="{7A847CFC-816F-41D0-AAC0-9BF4FEBC753E}" type="datetimeFigureOut">
               <a:rPr lang="es-ES" smtClean="0"/>
               <a:pPr/>
-              <a:t>14/10/2014</a:t>
+              <a:t>20/10/2014</a:t>
             </a:fld>
             <a:endParaRPr lang="es-ES"/>
           </a:p>
@@ -2865,7 +2866,7 @@
             <a:fld id="{7A847CFC-816F-41D0-AAC0-9BF4FEBC753E}" type="datetimeFigureOut">
               <a:rPr lang="es-ES" smtClean="0"/>
               <a:pPr/>
-              <a:t>14/10/2014</a:t>
+              <a:t>20/10/2014</a:t>
             </a:fld>
             <a:endParaRPr lang="es-ES"/>
           </a:p>
@@ -3103,7 +3104,7 @@
             <a:fld id="{7A847CFC-816F-41D0-AAC0-9BF4FEBC753E}" type="datetimeFigureOut">
               <a:rPr lang="es-ES" smtClean="0"/>
               <a:pPr/>
-              <a:t>14/10/2014</a:t>
+              <a:t>20/10/2014</a:t>
             </a:fld>
             <a:endParaRPr lang="es-ES"/>
           </a:p>
@@ -3428,7 +3429,7 @@
             <a:fld id="{7A847CFC-816F-41D0-AAC0-9BF4FEBC753E}" type="datetimeFigureOut">
               <a:rPr lang="es-ES" smtClean="0"/>
               <a:pPr/>
-              <a:t>14/10/2014</a:t>
+              <a:t>20/10/2014</a:t>
             </a:fld>
             <a:endParaRPr lang="es-ES"/>
           </a:p>
@@ -3520,7 +3521,7 @@
             <a:fld id="{7A847CFC-816F-41D0-AAC0-9BF4FEBC753E}" type="datetimeFigureOut">
               <a:rPr lang="es-ES" smtClean="0"/>
               <a:pPr/>
-              <a:t>14/10/2014</a:t>
+              <a:t>20/10/2014</a:t>
             </a:fld>
             <a:endParaRPr lang="es-ES"/>
           </a:p>
@@ -4039,7 +4040,7 @@
             <a:fld id="{7A847CFC-816F-41D0-AAC0-9BF4FEBC753E}" type="datetimeFigureOut">
               <a:rPr lang="es-ES" smtClean="0"/>
               <a:pPr/>
-              <a:t>14/10/2014</a:t>
+              <a:t>20/10/2014</a:t>
             </a:fld>
             <a:endParaRPr lang="es-ES"/>
           </a:p>
@@ -4552,7 +4553,7 @@
             <a:fld id="{7A847CFC-816F-41D0-AAC0-9BF4FEBC753E}" type="datetimeFigureOut">
               <a:rPr lang="es-ES" smtClean="0"/>
               <a:pPr/>
-              <a:t>14/10/2014</a:t>
+              <a:t>20/10/2014</a:t>
             </a:fld>
             <a:endParaRPr lang="es-ES"/>
           </a:p>
@@ -4799,7 +4800,7 @@
             <a:fld id="{7A847CFC-816F-41D0-AAC0-9BF4FEBC753E}" type="datetimeFigureOut">
               <a:rPr lang="es-ES" smtClean="0"/>
               <a:pPr/>
-              <a:t>14/10/2014</a:t>
+              <a:t>20/10/2014</a:t>
             </a:fld>
             <a:endParaRPr lang="es-ES"/>
           </a:p>
@@ -5602,7 +5603,7 @@
           <a:p>
             <a:r>
               <a:rPr lang="es-UY" b="1" dirty="0" smtClean="0"/>
-              <a:t>Análisis</a:t>
+              <a:t>Estudio Inicial</a:t>
             </a:r>
             <a:br>
               <a:rPr lang="es-UY" b="1" dirty="0" smtClean="0"/>
@@ -5623,79 +5624,53 @@
         </p:nvSpPr>
         <p:spPr/>
         <p:txBody>
-          <a:bodyPr/>
+          <a:bodyPr>
+            <a:noAutofit/>
+          </a:bodyPr>
           <a:lstStyle/>
           <a:p>
             <a:r>
               <a:rPr lang="es-UY" sz="2200" dirty="0" smtClean="0"/>
-              <a:t>Casos de uso: escenarios</a:t>
-            </a:r>
+              <a:t>PGE: Mostrar como funciona. Agregar </a:t>
+            </a:r>
+            <a:r>
+              <a:rPr lang="es-UY" sz="2200" dirty="0" err="1" smtClean="0"/>
+              <a:t>imagenes</a:t>
+            </a:r>
+            <a:endParaRPr lang="es-UY" sz="2200" dirty="0" smtClean="0"/>
+          </a:p>
+          <a:p>
+            <a:r>
+              <a:rPr lang="es-UY" sz="2200" dirty="0" smtClean="0"/>
+              <a:t>Propiedades</a:t>
+            </a:r>
+          </a:p>
+          <a:p>
+            <a:r>
+              <a:rPr lang="es-UY" sz="2200" dirty="0" smtClean="0"/>
+              <a:t>Funcionamiento</a:t>
+            </a:r>
+          </a:p>
+          <a:p>
+            <a:r>
+              <a:rPr lang="es-UY" sz="2200" dirty="0" smtClean="0"/>
+              <a:t>Manejo de direcciones</a:t>
+            </a:r>
+          </a:p>
+          <a:p>
+            <a:r>
+              <a:rPr lang="es-UY" sz="2200" dirty="0" smtClean="0"/>
+              <a:t>Seguridad</a:t>
+            </a:r>
+          </a:p>
+          <a:p>
+            <a:endParaRPr lang="es-UY" sz="2200" dirty="0" smtClean="0"/>
           </a:p>
           <a:p>
             <a:pPr>
               <a:buNone/>
             </a:pPr>
             <a:endParaRPr lang="es-UY" sz="2200" dirty="0" smtClean="0"/>
-          </a:p>
-          <a:p>
-            <a:pPr lvl="1"/>
-            <a:r>
-              <a:rPr lang="es-UY" sz="2000" dirty="0" smtClean="0"/>
-              <a:t>Público general consultado información geográfica</a:t>
-            </a:r>
-          </a:p>
-          <a:p>
-            <a:pPr lvl="1">
-              <a:buNone/>
-            </a:pPr>
-            <a:endParaRPr lang="es-UY" sz="2000" dirty="0" smtClean="0"/>
-          </a:p>
-          <a:p>
-            <a:pPr lvl="1"/>
-            <a:r>
-              <a:rPr lang="es-UY" sz="2000" dirty="0" smtClean="0"/>
-              <a:t>Público especializado consultando información geográfica</a:t>
-            </a:r>
-          </a:p>
-          <a:p>
-            <a:pPr lvl="1">
-              <a:buNone/>
-            </a:pPr>
-            <a:endParaRPr lang="es-UY" sz="2000" dirty="0" smtClean="0"/>
-          </a:p>
-          <a:p>
-            <a:pPr lvl="1"/>
-            <a:r>
-              <a:rPr lang="es-UY" sz="2000" dirty="0" smtClean="0"/>
-              <a:t>Instituciones colaborando en la generación de información geográfica</a:t>
-            </a:r>
-          </a:p>
-          <a:p>
-            <a:pPr lvl="1">
-              <a:buNone/>
-            </a:pPr>
-            <a:endParaRPr lang="es-UY" sz="2000" dirty="0" smtClean="0"/>
-          </a:p>
-          <a:p>
-            <a:pPr lvl="1"/>
-            <a:r>
-              <a:rPr lang="es-UY" sz="2000" dirty="0" smtClean="0"/>
-              <a:t>Instituciones colaborando en trámites</a:t>
-            </a:r>
-          </a:p>
-          <a:p>
-            <a:pPr lvl="1">
-              <a:buNone/>
-            </a:pPr>
-            <a:endParaRPr lang="es-UY" sz="2000" dirty="0" smtClean="0"/>
-          </a:p>
-          <a:p>
-            <a:pPr lvl="1"/>
-            <a:r>
-              <a:rPr lang="es-UY" sz="2000" dirty="0" smtClean="0"/>
-              <a:t>Público generando información geográfica</a:t>
-            </a:r>
-            <a:endParaRPr lang="es-UY" sz="2000" dirty="0"/>
           </a:p>
         </p:txBody>
       </p:sp>
@@ -5757,41 +5732,94 @@
           </a:p>
         </p:txBody>
       </p:sp>
-      <p:pic>
-        <p:nvPicPr>
-          <p:cNvPr id="3" name="Content Placeholder 2"/>
-          <p:cNvPicPr>
-            <a:picLocks noGrp="1" noChangeAspect="1" noChangeArrowheads="1"/>
-          </p:cNvPicPr>
+      <p:sp>
+        <p:nvSpPr>
+          <p:cNvPr id="3" name="2 Marcador de contenido"/>
+          <p:cNvSpPr>
+            <a:spLocks noGrp="1"/>
+          </p:cNvSpPr>
           <p:nvPr>
             <p:ph sz="quarter" idx="1"/>
           </p:nvPr>
-        </p:nvPicPr>
-        <p:blipFill>
-          <a:blip r:embed="rId2" cstate="print"/>
-          <a:srcRect/>
-          <a:stretch>
-            <a:fillRect/>
-          </a:stretch>
-        </p:blipFill>
-        <p:spPr bwMode="auto">
-          <a:xfrm>
-            <a:off x="187600" y="1428736"/>
-            <a:ext cx="7956300" cy="5416365"/>
-          </a:xfrm>
-          <a:prstGeom prst="rect">
-            <a:avLst/>
-          </a:prstGeom>
-          <a:noFill/>
-          <a:ln w="9525">
-            <a:noFill/>
-            <a:miter lim="800000"/>
-            <a:headEnd/>
-            <a:tailEnd/>
-          </a:ln>
-          <a:effectLst/>
-        </p:spPr>
-      </p:pic>
+        </p:nvSpPr>
+        <p:spPr/>
+        <p:txBody>
+          <a:bodyPr/>
+          <a:lstStyle/>
+          <a:p>
+            <a:r>
+              <a:rPr lang="es-UY" sz="2200" dirty="0" smtClean="0"/>
+              <a:t>Casos de uso: escenarios</a:t>
+            </a:r>
+          </a:p>
+          <a:p>
+            <a:pPr>
+              <a:buNone/>
+            </a:pPr>
+            <a:endParaRPr lang="es-UY" sz="2200" dirty="0" smtClean="0"/>
+          </a:p>
+          <a:p>
+            <a:pPr lvl="1"/>
+            <a:r>
+              <a:rPr lang="es-UY" sz="2000" dirty="0" smtClean="0"/>
+              <a:t>Público general consultado información geográfica</a:t>
+            </a:r>
+          </a:p>
+          <a:p>
+            <a:pPr lvl="1">
+              <a:buNone/>
+            </a:pPr>
+            <a:endParaRPr lang="es-UY" sz="2000" dirty="0" smtClean="0"/>
+          </a:p>
+          <a:p>
+            <a:pPr lvl="1"/>
+            <a:r>
+              <a:rPr lang="es-UY" sz="2000" dirty="0" smtClean="0"/>
+              <a:t>Público especializado consultando información geográfica</a:t>
+            </a:r>
+          </a:p>
+          <a:p>
+            <a:pPr lvl="1">
+              <a:buNone/>
+            </a:pPr>
+            <a:endParaRPr lang="es-UY" sz="2000" dirty="0" smtClean="0"/>
+          </a:p>
+          <a:p>
+            <a:pPr lvl="1"/>
+            <a:r>
+              <a:rPr lang="es-UY" sz="2000" dirty="0" smtClean="0"/>
+              <a:t>Instituciones colaborando en la generación de información geográfica</a:t>
+            </a:r>
+          </a:p>
+          <a:p>
+            <a:pPr lvl="1">
+              <a:buNone/>
+            </a:pPr>
+            <a:endParaRPr lang="es-UY" sz="2000" dirty="0" smtClean="0"/>
+          </a:p>
+          <a:p>
+            <a:pPr lvl="1"/>
+            <a:r>
+              <a:rPr lang="es-UY" sz="2000" dirty="0" smtClean="0"/>
+              <a:t>Instituciones colaborando en trámites</a:t>
+            </a:r>
+          </a:p>
+          <a:p>
+            <a:pPr lvl="1">
+              <a:buNone/>
+            </a:pPr>
+            <a:endParaRPr lang="es-UY" sz="2000" dirty="0" smtClean="0"/>
+          </a:p>
+          <a:p>
+            <a:pPr lvl="1"/>
+            <a:r>
+              <a:rPr lang="es-UY" sz="2000" dirty="0" smtClean="0"/>
+              <a:t>Público generando información geográfica</a:t>
+            </a:r>
+            <a:endParaRPr lang="es-UY" sz="2000" dirty="0"/>
+          </a:p>
+        </p:txBody>
+      </p:sp>
     </p:spTree>
   </p:cSld>
   <p:clrMapOvr>
@@ -5826,7 +5854,7 @@
       </p:grpSpPr>
       <p:sp>
         <p:nvSpPr>
-          <p:cNvPr id="2" name="Title 1"/>
+          <p:cNvPr id="2" name="1 Título"/>
           <p:cNvSpPr>
             <a:spLocks noGrp="1"/>
           </p:cNvSpPr>
@@ -5834,19 +5862,14 @@
             <p:ph type="title"/>
           </p:nvPr>
         </p:nvSpPr>
-        <p:spPr>
-          <a:xfrm>
-            <a:off x="457200" y="274638"/>
-            <a:ext cx="7901014" cy="1143000"/>
-          </a:xfrm>
-        </p:spPr>
+        <p:spPr/>
         <p:txBody>
           <a:bodyPr/>
           <a:lstStyle/>
           <a:p>
             <a:r>
               <a:rPr lang="es-UY" b="1" dirty="0" smtClean="0"/>
-              <a:t>Arquitectura propuesta en la tesis</a:t>
+              <a:t>Análisis</a:t>
             </a:r>
             <a:br>
               <a:rPr lang="es-UY" b="1" dirty="0" smtClean="0"/>
@@ -5855,32 +5878,15 @@
           </a:p>
         </p:txBody>
       </p:sp>
-      <p:sp>
-        <p:nvSpPr>
-          <p:cNvPr id="3" name="Content Placeholder 2"/>
-          <p:cNvSpPr>
-            <a:spLocks noGrp="1"/>
-          </p:cNvSpPr>
-          <p:nvPr>
-            <p:ph sz="quarter" idx="1"/>
-          </p:nvPr>
-        </p:nvSpPr>
-        <p:spPr/>
-        <p:txBody>
-          <a:bodyPr/>
-          <a:lstStyle/>
-          <a:p>
-            <a:endParaRPr lang="es-UY"/>
-          </a:p>
-        </p:txBody>
-      </p:sp>
       <p:pic>
         <p:nvPicPr>
-          <p:cNvPr id="1026" name="Picture 2"/>
+          <p:cNvPr id="3" name="Content Placeholder 2"/>
           <p:cNvPicPr>
-            <a:picLocks noChangeAspect="1" noChangeArrowheads="1"/>
+            <a:picLocks noGrp="1" noChangeAspect="1" noChangeArrowheads="1"/>
           </p:cNvPicPr>
-          <p:nvPr/>
+          <p:nvPr>
+            <p:ph sz="quarter" idx="1"/>
+          </p:nvPr>
         </p:nvPicPr>
         <p:blipFill>
           <a:blip r:embed="rId2" cstate="print"/>
@@ -5891,8 +5897,8 @@
         </p:blipFill>
         <p:spPr bwMode="auto">
           <a:xfrm>
-            <a:off x="355000" y="1368904"/>
-            <a:ext cx="7789863" cy="5353050"/>
+            <a:off x="187600" y="1428736"/>
+            <a:ext cx="7956300" cy="5416365"/>
           </a:xfrm>
           <a:prstGeom prst="rect">
             <a:avLst/>
@@ -5904,6 +5910,7 @@
             <a:headEnd/>
             <a:tailEnd/>
           </a:ln>
+          <a:effectLst/>
         </p:spPr>
       </p:pic>
     </p:spTree>
@@ -5948,14 +5955,19 @@
             <p:ph type="title"/>
           </p:nvPr>
         </p:nvSpPr>
-        <p:spPr/>
+        <p:spPr>
+          <a:xfrm>
+            <a:off x="457200" y="274638"/>
+            <a:ext cx="7901014" cy="1143000"/>
+          </a:xfrm>
+        </p:spPr>
         <p:txBody>
           <a:bodyPr/>
           <a:lstStyle/>
           <a:p>
             <a:r>
               <a:rPr lang="es-UY" b="1" dirty="0" smtClean="0"/>
-              <a:t>Decisiones de diseño</a:t>
+              <a:t>Arquitectura propuesta en la tesis</a:t>
             </a:r>
             <a:br>
               <a:rPr lang="es-UY" b="1" dirty="0" smtClean="0"/>
@@ -5979,91 +5991,42 @@
           <a:bodyPr/>
           <a:lstStyle/>
           <a:p>
-            <a:r>
-              <a:rPr lang="es-UY" sz="2200" dirty="0" smtClean="0"/>
-              <a:t>CTP como servicios y no como librerías</a:t>
-            </a:r>
-          </a:p>
-          <a:p>
-            <a:pPr lvl="1"/>
-            <a:r>
-              <a:rPr lang="es-UY" sz="2000" dirty="0" smtClean="0"/>
-              <a:t>Soporte máximo a clientes geográficos existentes</a:t>
-            </a:r>
-          </a:p>
-          <a:p>
-            <a:pPr lvl="1"/>
-            <a:r>
-              <a:rPr lang="es-UY" sz="2000" dirty="0" smtClean="0"/>
-              <a:t>Bajo acoplamiento con implementaciones y tecnologías.</a:t>
-            </a:r>
-          </a:p>
-          <a:p>
-            <a:endParaRPr lang="es-UY" sz="2000" dirty="0" smtClean="0"/>
-          </a:p>
-          <a:p>
-            <a:r>
-              <a:rPr lang="es-UY" sz="2200" dirty="0" smtClean="0"/>
-              <a:t>CTP </a:t>
-            </a:r>
-            <a:r>
-              <a:rPr lang="es-UY" sz="2200" dirty="0" err="1" smtClean="0"/>
-              <a:t>RestConnector</a:t>
-            </a:r>
-            <a:r>
-              <a:rPr lang="es-UY" sz="2200" dirty="0" smtClean="0"/>
-              <a:t> distribuido en organismos.</a:t>
-            </a:r>
-            <a:endParaRPr lang="es-UY" sz="2000" dirty="0" smtClean="0"/>
-          </a:p>
-          <a:p>
-            <a:pPr lvl="1"/>
-            <a:r>
-              <a:rPr lang="es-UY" sz="2000" dirty="0" smtClean="0"/>
-              <a:t>Mapeo de direcciones físicas y lógicas</a:t>
-            </a:r>
-          </a:p>
-          <a:p>
-            <a:pPr lvl="1"/>
-            <a:r>
-              <a:rPr lang="es-UY" sz="2000" dirty="0" smtClean="0"/>
-              <a:t>Evitar cuello de botella y único punto de falla</a:t>
-            </a:r>
-          </a:p>
-          <a:p>
-            <a:pPr lvl="1"/>
-            <a:r>
-              <a:rPr lang="es-UY" sz="2000" dirty="0" smtClean="0"/>
-              <a:t>Facilitar configuración y mantenimiento</a:t>
-            </a:r>
-          </a:p>
-          <a:p>
-            <a:endParaRPr lang="es-UY" sz="2000" dirty="0" smtClean="0"/>
-          </a:p>
-          <a:p>
-            <a:r>
-              <a:rPr lang="es-UY" sz="2200" dirty="0" smtClean="0"/>
-              <a:t>CTP </a:t>
-            </a:r>
-            <a:r>
-              <a:rPr lang="es-UY" sz="2200" dirty="0" err="1" smtClean="0"/>
-              <a:t>SoapConnector</a:t>
-            </a:r>
-            <a:r>
-              <a:rPr lang="es-UY" sz="2200" dirty="0" smtClean="0"/>
-              <a:t> único por servicio geográfico</a:t>
-            </a:r>
-          </a:p>
-          <a:p>
-            <a:pPr lvl="1"/>
-            <a:r>
-              <a:rPr lang="es-UY" sz="2000" dirty="0" smtClean="0"/>
-              <a:t>Por mapeo de direcciones físicas y lógicas</a:t>
-            </a:r>
-            <a:endParaRPr lang="es-UY" sz="2000" dirty="0"/>
-          </a:p>
-        </p:txBody>
-      </p:sp>
+            <a:endParaRPr lang="es-UY"/>
+          </a:p>
+        </p:txBody>
+      </p:sp>
+      <p:pic>
+        <p:nvPicPr>
+          <p:cNvPr id="1026" name="Picture 2"/>
+          <p:cNvPicPr>
+            <a:picLocks noChangeAspect="1" noChangeArrowheads="1"/>
+          </p:cNvPicPr>
+          <p:nvPr/>
+        </p:nvPicPr>
+        <p:blipFill>
+          <a:blip r:embed="rId2" cstate="print"/>
+          <a:srcRect/>
+          <a:stretch>
+            <a:fillRect/>
+          </a:stretch>
+        </p:blipFill>
+        <p:spPr bwMode="auto">
+          <a:xfrm>
+            <a:off x="355000" y="1368904"/>
+            <a:ext cx="7789863" cy="5353050"/>
+          </a:xfrm>
+          <a:prstGeom prst="rect">
+            <a:avLst/>
+          </a:prstGeom>
+          <a:noFill/>
+          <a:ln w="9525">
+            <a:noFill/>
+            <a:miter lim="800000"/>
+            <a:headEnd/>
+            <a:tailEnd/>
+          </a:ln>
+        </p:spPr>
+      </p:pic>
     </p:spTree>
   </p:cSld>
   <p:clrMapOvr>
@@ -6113,7 +6076,7 @@
           <a:p>
             <a:r>
               <a:rPr lang="es-UY" b="1" dirty="0" smtClean="0"/>
-              <a:t>Arquitectura</a:t>
+              <a:t>Decisiones de diseño</a:t>
             </a:r>
             <a:br>
               <a:rPr lang="es-UY" b="1" dirty="0" smtClean="0"/>
@@ -6137,43 +6100,91 @@
           <a:bodyPr/>
           <a:lstStyle/>
           <a:p>
-            <a:pPr>
-              <a:buNone/>
-            </a:pPr>
-            <a:endParaRPr lang="es-UY" dirty="0"/>
-          </a:p>
-        </p:txBody>
-      </p:sp>
-      <p:pic>
-        <p:nvPicPr>
-          <p:cNvPr id="4" name="Picture 3"/>
-          <p:cNvPicPr/>
-          <p:nvPr/>
-        </p:nvPicPr>
-        <p:blipFill>
-          <a:blip r:embed="rId2" cstate="print"/>
-          <a:srcRect/>
-          <a:stretch>
-            <a:fillRect/>
-          </a:stretch>
-        </p:blipFill>
-        <p:spPr bwMode="auto">
-          <a:xfrm>
-            <a:off x="226720" y="2564904"/>
-            <a:ext cx="8377728" cy="1152128"/>
-          </a:xfrm>
-          <a:prstGeom prst="rect">
-            <a:avLst/>
-          </a:prstGeom>
-          <a:noFill/>
-          <a:ln w="9525">
-            <a:noFill/>
-            <a:miter lim="800000"/>
-            <a:headEnd/>
-            <a:tailEnd/>
-          </a:ln>
-        </p:spPr>
-      </p:pic>
+            <a:r>
+              <a:rPr lang="es-UY" sz="2200" dirty="0" smtClean="0"/>
+              <a:t>CTP como servicios y no como librerías</a:t>
+            </a:r>
+          </a:p>
+          <a:p>
+            <a:pPr lvl="1"/>
+            <a:r>
+              <a:rPr lang="es-UY" sz="2000" dirty="0" smtClean="0"/>
+              <a:t>Soporte máximo a clientes geográficos existentes</a:t>
+            </a:r>
+          </a:p>
+          <a:p>
+            <a:pPr lvl="1"/>
+            <a:r>
+              <a:rPr lang="es-UY" sz="2000" dirty="0" smtClean="0"/>
+              <a:t>Bajo acoplamiento con implementaciones y tecnologías.</a:t>
+            </a:r>
+          </a:p>
+          <a:p>
+            <a:endParaRPr lang="es-UY" sz="2000" dirty="0" smtClean="0"/>
+          </a:p>
+          <a:p>
+            <a:r>
+              <a:rPr lang="es-UY" sz="2200" dirty="0" smtClean="0"/>
+              <a:t>CTP </a:t>
+            </a:r>
+            <a:r>
+              <a:rPr lang="es-UY" sz="2200" dirty="0" err="1" smtClean="0"/>
+              <a:t>RestConnector</a:t>
+            </a:r>
+            <a:r>
+              <a:rPr lang="es-UY" sz="2200" dirty="0" smtClean="0"/>
+              <a:t> distribuido en organismos.</a:t>
+            </a:r>
+            <a:endParaRPr lang="es-UY" sz="2000" dirty="0" smtClean="0"/>
+          </a:p>
+          <a:p>
+            <a:pPr lvl="1"/>
+            <a:r>
+              <a:rPr lang="es-UY" sz="2000" dirty="0" smtClean="0"/>
+              <a:t>Mapeo de direcciones físicas y lógicas</a:t>
+            </a:r>
+          </a:p>
+          <a:p>
+            <a:pPr lvl="1"/>
+            <a:r>
+              <a:rPr lang="es-UY" sz="2000" dirty="0" smtClean="0"/>
+              <a:t>Evitar cuello de botella y único punto de falla</a:t>
+            </a:r>
+          </a:p>
+          <a:p>
+            <a:pPr lvl="1"/>
+            <a:r>
+              <a:rPr lang="es-UY" sz="2000" dirty="0" smtClean="0"/>
+              <a:t>Facilitar configuración y mantenimiento</a:t>
+            </a:r>
+          </a:p>
+          <a:p>
+            <a:endParaRPr lang="es-UY" sz="2000" dirty="0" smtClean="0"/>
+          </a:p>
+          <a:p>
+            <a:r>
+              <a:rPr lang="es-UY" sz="2200" dirty="0" smtClean="0"/>
+              <a:t>CTP </a:t>
+            </a:r>
+            <a:r>
+              <a:rPr lang="es-UY" sz="2200" dirty="0" err="1" smtClean="0"/>
+              <a:t>SoapConnector</a:t>
+            </a:r>
+            <a:r>
+              <a:rPr lang="es-UY" sz="2200" dirty="0" smtClean="0"/>
+              <a:t> único por servicio geográfico</a:t>
+            </a:r>
+          </a:p>
+          <a:p>
+            <a:pPr lvl="1"/>
+            <a:r>
+              <a:rPr lang="es-UY" sz="2000" dirty="0" smtClean="0"/>
+              <a:t>Por mapeo de direcciones físicas y lógicas</a:t>
+            </a:r>
+            <a:endParaRPr lang="es-UY" sz="2000" dirty="0"/>
+          </a:p>
+        </p:txBody>
+      </p:sp>
     </p:spTree>
   </p:cSld>
   <p:clrMapOvr>
@@ -6208,7 +6219,7 @@
       </p:grpSpPr>
       <p:sp>
         <p:nvSpPr>
-          <p:cNvPr id="2" name="1 Título"/>
+          <p:cNvPr id="2" name="Title 1"/>
           <p:cNvSpPr>
             <a:spLocks noGrp="1"/>
           </p:cNvSpPr>
@@ -6223,7 +6234,7 @@
           <a:p>
             <a:r>
               <a:rPr lang="es-UY" b="1" dirty="0" smtClean="0"/>
-              <a:t>Diseño</a:t>
+              <a:t>Arquitectura</a:t>
             </a:r>
             <a:br>
               <a:rPr lang="es-UY" b="1" dirty="0" smtClean="0"/>
@@ -6234,7 +6245,7 @@
       </p:sp>
       <p:sp>
         <p:nvSpPr>
-          <p:cNvPr id="3" name="2 Marcador de contenido"/>
+          <p:cNvPr id="3" name="Content Placeholder 2"/>
           <p:cNvSpPr>
             <a:spLocks noGrp="1"/>
           </p:cNvSpPr>
@@ -6246,29 +6257,18 @@
         <p:txBody>
           <a:bodyPr/>
           <a:lstStyle/>
-          <a:p>
-            <a:r>
-              <a:rPr lang="es-UY" sz="2200" dirty="0" smtClean="0"/>
-              <a:t>Organismo cliente</a:t>
-            </a:r>
-          </a:p>
           <a:p>
             <a:pPr>
               <a:buNone/>
             </a:pPr>
-            <a:endParaRPr lang="es-UY" sz="2200" dirty="0" smtClean="0"/>
-          </a:p>
-          <a:p>
-            <a:endParaRPr lang="es-UY" sz="2000" dirty="0"/>
+            <a:endParaRPr lang="es-UY" dirty="0"/>
           </a:p>
         </p:txBody>
       </p:sp>
       <p:pic>
         <p:nvPicPr>
-          <p:cNvPr id="2050" name="Picture 2"/>
-          <p:cNvPicPr>
-            <a:picLocks noChangeAspect="1" noChangeArrowheads="1"/>
-          </p:cNvPicPr>
+          <p:cNvPr id="4" name="Picture 3"/>
+          <p:cNvPicPr/>
           <p:nvPr/>
         </p:nvPicPr>
         <p:blipFill>
@@ -6280,8 +6280,8 @@
         </p:blipFill>
         <p:spPr bwMode="auto">
           <a:xfrm>
-            <a:off x="214282" y="2337872"/>
-            <a:ext cx="7917552" cy="4000528"/>
+            <a:off x="226720" y="2564904"/>
+            <a:ext cx="8377728" cy="1152128"/>
           </a:xfrm>
           <a:prstGeom prst="rect">
             <a:avLst/>
@@ -6293,7 +6293,6 @@
             <a:headEnd/>
             <a:tailEnd/>
           </a:ln>
-          <a:effectLst/>
         </p:spPr>
       </p:pic>
     </p:spTree>
@@ -6371,7 +6370,7 @@
           <a:p>
             <a:r>
               <a:rPr lang="es-UY" sz="2200" dirty="0" smtClean="0"/>
-              <a:t>Público general</a:t>
+              <a:t>Organismo cliente</a:t>
             </a:r>
           </a:p>
           <a:p>
@@ -6387,7 +6386,7 @@
       </p:sp>
       <p:pic>
         <p:nvPicPr>
-          <p:cNvPr id="1026" name="Picture 2"/>
+          <p:cNvPr id="2050" name="Picture 2"/>
           <p:cNvPicPr>
             <a:picLocks noChangeAspect="1" noChangeArrowheads="1"/>
           </p:cNvPicPr>
@@ -6402,8 +6401,8 @@
         </p:blipFill>
         <p:spPr bwMode="auto">
           <a:xfrm>
-            <a:off x="160205" y="2058708"/>
-            <a:ext cx="7940695" cy="4370688"/>
+            <a:off x="214282" y="2337872"/>
+            <a:ext cx="7917552" cy="4000528"/>
           </a:xfrm>
           <a:prstGeom prst="rect">
             <a:avLst/>
@@ -6467,7 +6466,7 @@
           <a:p>
             <a:r>
               <a:rPr lang="es-UY" b="1" dirty="0" smtClean="0"/>
-              <a:t>Tecnologías</a:t>
+              <a:t>Diseño</a:t>
             </a:r>
             <a:br>
               <a:rPr lang="es-UY" b="1" dirty="0" smtClean="0"/>
@@ -6491,104 +6490,55 @@
           <a:bodyPr/>
           <a:lstStyle/>
           <a:p>
+            <a:r>
+              <a:rPr lang="es-UY" sz="2200" dirty="0" smtClean="0"/>
+              <a:t>Público general</a:t>
+            </a:r>
+          </a:p>
+          <a:p>
             <a:pPr>
               <a:buNone/>
             </a:pPr>
             <a:endParaRPr lang="es-UY" sz="2200" dirty="0" smtClean="0"/>
           </a:p>
           <a:p>
-            <a:r>
-              <a:rPr lang="es-UY" sz="2200" dirty="0" smtClean="0"/>
-              <a:t>Servidores geográficos</a:t>
-            </a:r>
-          </a:p>
-          <a:p>
-            <a:pPr lvl="1"/>
-            <a:r>
-              <a:rPr lang="es-UY" sz="2000" dirty="0" err="1" smtClean="0"/>
-              <a:t>Geoserver</a:t>
-            </a:r>
-            <a:endParaRPr lang="es-UY" sz="2000" dirty="0" smtClean="0"/>
-          </a:p>
-          <a:p>
-            <a:pPr lvl="1"/>
-            <a:r>
-              <a:rPr lang="es-UY" sz="2000" dirty="0" err="1" smtClean="0"/>
-              <a:t>Mapserver</a:t>
-            </a:r>
-            <a:endParaRPr lang="es-UY" sz="2000" dirty="0" smtClean="0"/>
-          </a:p>
-          <a:p>
-            <a:pPr>
-              <a:buNone/>
-            </a:pPr>
-            <a:endParaRPr lang="es-UY" sz="2200" dirty="0" smtClean="0"/>
-          </a:p>
-          <a:p>
-            <a:r>
-              <a:rPr lang="es-UY" sz="2200" dirty="0" err="1" smtClean="0"/>
-              <a:t>Jboss</a:t>
-            </a:r>
-            <a:r>
-              <a:rPr lang="es-UY" sz="2200" dirty="0" smtClean="0"/>
-              <a:t> ESB 4.9</a:t>
-            </a:r>
-          </a:p>
-          <a:p>
-            <a:pPr>
-              <a:buNone/>
-            </a:pPr>
-            <a:endParaRPr lang="es-UY" sz="2200" dirty="0" smtClean="0"/>
-          </a:p>
-          <a:p>
-            <a:r>
-              <a:rPr lang="es-UY" sz="2200" dirty="0" smtClean="0"/>
-              <a:t>Plataforma de </a:t>
-            </a:r>
-            <a:r>
-              <a:rPr lang="es-UY" sz="2200" dirty="0" err="1" smtClean="0"/>
-              <a:t>eGob</a:t>
-            </a:r>
-            <a:r>
-              <a:rPr lang="es-UY" sz="2200" dirty="0" smtClean="0"/>
-              <a:t> de Uruguay</a:t>
-            </a:r>
-          </a:p>
-          <a:p>
-            <a:pPr>
-              <a:buNone/>
-            </a:pPr>
-            <a:endParaRPr lang="es-UY" sz="2200" dirty="0" smtClean="0"/>
-          </a:p>
-          <a:p>
-            <a:r>
-              <a:rPr lang="es-UY" sz="2200" dirty="0" err="1" smtClean="0"/>
-              <a:t>Postgres</a:t>
-            </a:r>
-            <a:r>
-              <a:rPr lang="es-UY" sz="2200" dirty="0" smtClean="0"/>
-              <a:t> / </a:t>
-            </a:r>
-            <a:r>
-              <a:rPr lang="es-UY" sz="2200" dirty="0" err="1" smtClean="0"/>
-              <a:t>Postgis</a:t>
-            </a:r>
-            <a:endParaRPr lang="es-UY" sz="2200" dirty="0" smtClean="0"/>
-          </a:p>
-          <a:p>
-            <a:pPr>
-              <a:buNone/>
-            </a:pPr>
-            <a:endParaRPr lang="es-UY" sz="2200" dirty="0" smtClean="0"/>
-          </a:p>
-          <a:p>
-            <a:pPr lvl="1">
-              <a:buNone/>
-            </a:pPr>
-            <a:endParaRPr lang="es-UY" dirty="0"/>
-          </a:p>
-        </p:txBody>
-      </p:sp>
+            <a:endParaRPr lang="es-UY" sz="2000" dirty="0"/>
+          </a:p>
+        </p:txBody>
+      </p:sp>
+      <p:pic>
+        <p:nvPicPr>
+          <p:cNvPr id="1026" name="Picture 2"/>
+          <p:cNvPicPr>
+            <a:picLocks noChangeAspect="1" noChangeArrowheads="1"/>
+          </p:cNvPicPr>
+          <p:nvPr/>
+        </p:nvPicPr>
+        <p:blipFill>
+          <a:blip r:embed="rId2" cstate="print"/>
+          <a:srcRect/>
+          <a:stretch>
+            <a:fillRect/>
+          </a:stretch>
+        </p:blipFill>
+        <p:spPr bwMode="auto">
+          <a:xfrm>
+            <a:off x="160205" y="2058708"/>
+            <a:ext cx="7940695" cy="4370688"/>
+          </a:xfrm>
+          <a:prstGeom prst="rect">
+            <a:avLst/>
+          </a:prstGeom>
+          <a:noFill/>
+          <a:ln w="9525">
+            <a:noFill/>
+            <a:miter lim="800000"/>
+            <a:headEnd/>
+            <a:tailEnd/>
+          </a:ln>
+          <a:effectLst/>
+        </p:spPr>
+      </p:pic>
     </p:spTree>
   </p:cSld>
   <p:clrMapOvr>
@@ -6638,7 +6588,7 @@
           <a:p>
             <a:r>
               <a:rPr lang="es-UY" b="1" dirty="0" smtClean="0"/>
-              <a:t>Estado Actual</a:t>
+              <a:t>Tecnologías</a:t>
             </a:r>
             <a:br>
               <a:rPr lang="es-UY" b="1" dirty="0" smtClean="0"/>
@@ -6659,90 +6609,104 @@
         </p:nvSpPr>
         <p:spPr/>
         <p:txBody>
-          <a:bodyPr>
-            <a:normAutofit/>
-          </a:bodyPr>
-          <a:lstStyle/>
-          <a:p>
-            <a:r>
-              <a:rPr lang="es-UY" sz="2200" smtClean="0"/>
-              <a:t>Implementación</a:t>
-            </a:r>
+          <a:bodyPr/>
+          <a:lstStyle/>
+          <a:p>
+            <a:pPr>
+              <a:buNone/>
+            </a:pPr>
             <a:endParaRPr lang="es-UY" sz="2200" dirty="0" smtClean="0"/>
           </a:p>
           <a:p>
+            <a:r>
+              <a:rPr lang="es-UY" sz="2200" dirty="0" smtClean="0"/>
+              <a:t>Servidores geográficos</a:t>
+            </a:r>
+          </a:p>
+          <a:p>
             <a:pPr lvl="1"/>
             <a:r>
-              <a:rPr lang="es-UY" sz="2000" dirty="0" smtClean="0"/>
-              <a:t>Flujo Organismo cliente – PGE – Organismo proveedor</a:t>
-            </a:r>
+              <a:rPr lang="es-UY" sz="2000" dirty="0" err="1" smtClean="0"/>
+              <a:t>Geoserver</a:t>
+            </a:r>
+            <a:endParaRPr lang="es-UY" sz="2000" dirty="0" smtClean="0"/>
           </a:p>
           <a:p>
             <a:pPr lvl="1"/>
             <a:r>
-              <a:rPr lang="es-UY" sz="2000" dirty="0" smtClean="0"/>
-              <a:t>Flujo Público general – PGE – Organismo proveedor</a:t>
-            </a:r>
-          </a:p>
-          <a:p>
-            <a:pPr lvl="1"/>
-            <a:r>
               <a:rPr lang="es-UY" sz="2000" dirty="0" err="1" smtClean="0"/>
-              <a:t>getMap</a:t>
-            </a:r>
-            <a:r>
-              <a:rPr lang="es-UY" sz="2000" dirty="0" smtClean="0"/>
-              <a:t> y </a:t>
-            </a:r>
-            <a:r>
-              <a:rPr lang="es-UY" sz="2000" dirty="0" err="1" smtClean="0"/>
-              <a:t>getFeatureInfo</a:t>
-            </a:r>
-            <a:r>
-              <a:rPr lang="es-UY" sz="2000" dirty="0" smtClean="0"/>
-              <a:t> </a:t>
-            </a:r>
+              <a:t>Mapserver</a:t>
+            </a:r>
+            <a:endParaRPr lang="es-UY" sz="2000" dirty="0" smtClean="0"/>
+          </a:p>
+          <a:p>
+            <a:pPr>
+              <a:buNone/>
+            </a:pPr>
+            <a:endParaRPr lang="es-UY" sz="2200" dirty="0" smtClean="0"/>
+          </a:p>
+          <a:p>
+            <a:r>
+              <a:rPr lang="es-UY" sz="2200" dirty="0" err="1" smtClean="0"/>
+              <a:t>Jboss</a:t>
+            </a:r>
+            <a:r>
+              <a:rPr lang="es-UY" sz="2200" dirty="0" smtClean="0"/>
+              <a:t> ESB 4.9</a:t>
+            </a:r>
+          </a:p>
+          <a:p>
+            <a:pPr>
+              <a:buNone/>
+            </a:pPr>
+            <a:endParaRPr lang="es-UY" sz="2200" dirty="0" smtClean="0"/>
+          </a:p>
+          <a:p>
+            <a:r>
+              <a:rPr lang="es-UY" sz="2200" dirty="0" smtClean="0"/>
+              <a:t>Plataforma de </a:t>
+            </a:r>
+            <a:r>
+              <a:rPr lang="es-UY" sz="2200" dirty="0" err="1" smtClean="0"/>
+              <a:t>eGob</a:t>
+            </a:r>
+            <a:r>
+              <a:rPr lang="es-UY" sz="2200" dirty="0" smtClean="0"/>
+              <a:t> de Uruguay</a:t>
+            </a:r>
+          </a:p>
+          <a:p>
+            <a:pPr>
+              <a:buNone/>
+            </a:pPr>
+            <a:endParaRPr lang="es-UY" sz="2200" dirty="0" smtClean="0"/>
+          </a:p>
+          <a:p>
+            <a:r>
+              <a:rPr lang="es-UY" sz="2200" dirty="0" err="1" smtClean="0"/>
+              <a:t>Postgres</a:t>
+            </a:r>
+            <a:r>
+              <a:rPr lang="es-UY" sz="2200" dirty="0" smtClean="0"/>
+              <a:t> / </a:t>
+            </a:r>
+            <a:r>
+              <a:rPr lang="es-UY" sz="2200" dirty="0" err="1" smtClean="0"/>
+              <a:t>Postgis</a:t>
+            </a:r>
+            <a:endParaRPr lang="es-UY" sz="2200" dirty="0" smtClean="0"/>
+          </a:p>
+          <a:p>
+            <a:pPr>
+              <a:buNone/>
+            </a:pPr>
+            <a:endParaRPr lang="es-UY" sz="2200" dirty="0" smtClean="0"/>
           </a:p>
           <a:p>
             <a:pPr lvl="1">
               <a:buNone/>
             </a:pPr>
-            <a:endParaRPr lang="es-UY" sz="2200" dirty="0" smtClean="0"/>
-          </a:p>
-          <a:p>
-            <a:r>
-              <a:rPr lang="es-UY" sz="2200" dirty="0" smtClean="0"/>
-              <a:t>Documentación</a:t>
-            </a:r>
-          </a:p>
-          <a:p>
-            <a:pPr lvl="1"/>
-            <a:r>
-              <a:rPr lang="es-UY" sz="2000" dirty="0" smtClean="0"/>
-              <a:t>Casos de uso</a:t>
-            </a:r>
-          </a:p>
-          <a:p>
-            <a:pPr lvl="1"/>
-            <a:r>
-              <a:rPr lang="es-UY" sz="2000" dirty="0" smtClean="0"/>
-              <a:t>Arquitectura</a:t>
-            </a:r>
-          </a:p>
-          <a:p>
-            <a:pPr lvl="1"/>
-            <a:r>
-              <a:rPr lang="es-UY" sz="2000" dirty="0" smtClean="0"/>
-              <a:t>Documento principal</a:t>
-            </a:r>
-          </a:p>
-          <a:p>
-            <a:pPr lvl="1"/>
-            <a:endParaRPr lang="es-UY" sz="2000" dirty="0" smtClean="0"/>
-          </a:p>
-          <a:p>
-            <a:pPr lvl="1"/>
-            <a:endParaRPr lang="es-UY" sz="2200" dirty="0"/>
+            <a:endParaRPr lang="es-UY" dirty="0"/>
           </a:p>
         </p:txBody>
       </p:sp>
@@ -6795,7 +6759,7 @@
           <a:p>
             <a:r>
               <a:rPr lang="es-UY" b="1" dirty="0" smtClean="0"/>
-              <a:t>Planificación al cierre</a:t>
+              <a:t>Estado Actual</a:t>
             </a:r>
             <a:br>
               <a:rPr lang="es-UY" b="1" dirty="0" smtClean="0"/>
@@ -6817,25 +6781,51 @@
         <p:spPr/>
         <p:txBody>
           <a:bodyPr>
-            <a:normAutofit lnSpcReduction="10000"/>
+            <a:normAutofit/>
           </a:bodyPr>
           <a:lstStyle/>
           <a:p>
             <a:r>
-              <a:rPr lang="es-UY" sz="2200" dirty="0" smtClean="0"/>
-              <a:t>Integración con STS (2 </a:t>
-            </a:r>
-            <a:r>
-              <a:rPr lang="es-UY" sz="2200" dirty="0" err="1" smtClean="0"/>
-              <a:t>sem</a:t>
-            </a:r>
-            <a:r>
-              <a:rPr lang="es-UY" sz="2200" dirty="0" smtClean="0"/>
-              <a:t>.)</a:t>
-            </a:r>
-          </a:p>
-          <a:p>
-            <a:pPr>
+              <a:rPr lang="es-UY" sz="2200" smtClean="0"/>
+              <a:t>Implementación</a:t>
+            </a:r>
+            <a:endParaRPr lang="es-UY" sz="2200" dirty="0" smtClean="0"/>
+          </a:p>
+          <a:p>
+            <a:pPr lvl="1"/>
+            <a:r>
+              <a:rPr lang="es-UY" sz="2000" dirty="0" smtClean="0"/>
+              <a:t>Flujo Organismo cliente – PGE – Organismo proveedor</a:t>
+            </a:r>
+          </a:p>
+          <a:p>
+            <a:pPr lvl="1"/>
+            <a:r>
+              <a:rPr lang="es-UY" sz="2000" dirty="0" smtClean="0"/>
+              <a:t>Flujo Público general – PGE – Organismo proveedor</a:t>
+            </a:r>
+          </a:p>
+          <a:p>
+            <a:pPr lvl="1"/>
+            <a:r>
+              <a:rPr lang="es-UY" sz="2000" dirty="0" err="1" smtClean="0"/>
+              <a:t>getMap</a:t>
+            </a:r>
+            <a:r>
+              <a:rPr lang="es-UY" sz="2000" dirty="0" smtClean="0"/>
+              <a:t> y </a:t>
+            </a:r>
+            <a:r>
+              <a:rPr lang="es-UY" sz="2000" dirty="0" err="1" smtClean="0"/>
+              <a:t>getFeatureInfo</a:t>
+            </a:r>
+            <a:r>
+              <a:rPr lang="es-UY" sz="2000" dirty="0" smtClean="0"/>
+              <a:t> </a:t>
+            </a:r>
+          </a:p>
+          <a:p>
+            <a:pPr lvl="1">
               <a:buNone/>
             </a:pPr>
             <a:endParaRPr lang="es-UY" sz="2200" dirty="0" smtClean="0"/>
@@ -6843,95 +6833,36 @@
           <a:p>
             <a:r>
               <a:rPr lang="es-UY" sz="2200" dirty="0" smtClean="0"/>
-              <a:t>Manejo de excepciones (1 </a:t>
-            </a:r>
-            <a:r>
-              <a:rPr lang="es-UY" sz="2200" dirty="0" err="1" smtClean="0"/>
-              <a:t>sem</a:t>
-            </a:r>
-            <a:r>
-              <a:rPr lang="es-UY" sz="2200" dirty="0" smtClean="0"/>
-              <a:t>.)</a:t>
-            </a:r>
-          </a:p>
-          <a:p>
-            <a:endParaRPr lang="es-UY" sz="2200" dirty="0" smtClean="0"/>
-          </a:p>
-          <a:p>
-            <a:r>
-              <a:rPr lang="es-UY" sz="2200" dirty="0" smtClean="0"/>
-              <a:t>Evaluar opciones de asincronismo (1 </a:t>
-            </a:r>
-            <a:r>
-              <a:rPr lang="es-UY" sz="2200" dirty="0" err="1" smtClean="0"/>
-              <a:t>sem</a:t>
-            </a:r>
-            <a:r>
-              <a:rPr lang="es-UY" sz="2200" dirty="0" smtClean="0"/>
-              <a:t>.)</a:t>
-            </a:r>
-          </a:p>
-          <a:p>
-            <a:pPr>
-              <a:buNone/>
-            </a:pPr>
-            <a:endParaRPr lang="es-UY" sz="2200" dirty="0" smtClean="0"/>
-          </a:p>
-          <a:p>
-            <a:r>
-              <a:rPr lang="es-UY" sz="2200" dirty="0" smtClean="0"/>
-              <a:t>Completar prueba de estándares WMS y WFS (2 </a:t>
-            </a:r>
-            <a:r>
-              <a:rPr lang="es-UY" sz="2200" dirty="0" err="1" smtClean="0"/>
-              <a:t>sem</a:t>
-            </a:r>
-            <a:r>
-              <a:rPr lang="es-UY" sz="2200" dirty="0" smtClean="0"/>
-              <a:t>.)</a:t>
-            </a:r>
-          </a:p>
-          <a:p>
-            <a:pPr>
-              <a:buNone/>
-            </a:pPr>
-            <a:endParaRPr lang="es-UY" sz="2200" dirty="0" smtClean="0"/>
-          </a:p>
-          <a:p>
-            <a:r>
-              <a:rPr lang="es-UY" sz="2200" dirty="0" smtClean="0"/>
-              <a:t>Diseñar caso de estudio (1 </a:t>
-            </a:r>
-            <a:r>
-              <a:rPr lang="es-UY" sz="2200" dirty="0" err="1" smtClean="0"/>
-              <a:t>sem</a:t>
-            </a:r>
-            <a:r>
-              <a:rPr lang="es-UY" sz="2200" dirty="0" smtClean="0"/>
-              <a:t>.)</a:t>
-            </a:r>
-          </a:p>
-          <a:p>
-            <a:pPr>
-              <a:buNone/>
-            </a:pPr>
-            <a:endParaRPr lang="es-UY" sz="2200" dirty="0" smtClean="0"/>
-          </a:p>
-          <a:p>
-            <a:r>
-              <a:rPr lang="es-UY" sz="2200" dirty="0" smtClean="0"/>
-              <a:t>Finalizar documento principal (2 </a:t>
-            </a:r>
-            <a:r>
-              <a:rPr lang="es-UY" sz="2200" dirty="0" err="1" smtClean="0"/>
-              <a:t>sem</a:t>
-            </a:r>
-            <a:r>
-              <a:rPr lang="es-UY" sz="2200" dirty="0" smtClean="0"/>
-              <a:t>.)</a:t>
-            </a:r>
-          </a:p>
-          <a:p>
+              <a:t>Documentación</a:t>
+            </a:r>
+          </a:p>
+          <a:p>
+            <a:pPr lvl="1"/>
+            <a:r>
+              <a:rPr lang="es-UY" sz="2000" dirty="0" smtClean="0"/>
+              <a:t>Casos de uso</a:t>
+            </a:r>
+          </a:p>
+          <a:p>
+            <a:pPr lvl="1"/>
+            <a:r>
+              <a:rPr lang="es-UY" sz="2000" dirty="0" smtClean="0"/>
+              <a:t>Arquitectura</a:t>
+            </a:r>
+          </a:p>
+          <a:p>
+            <a:pPr lvl="1"/>
+            <a:r>
+              <a:rPr lang="es-UY" sz="2000" dirty="0" smtClean="0"/>
+              <a:t>Documento principal</a:t>
+            </a:r>
+          </a:p>
+          <a:p>
+            <a:pPr lvl="1"/>
+            <a:endParaRPr lang="es-UY" sz="2000" dirty="0" smtClean="0"/>
+          </a:p>
+          <a:p>
+            <a:pPr lvl="1"/>
             <a:endParaRPr lang="es-UY" sz="2200" dirty="0"/>
           </a:p>
         </p:txBody>
@@ -7121,6 +7052,196 @@
       </p:grpSpPr>
       <p:sp>
         <p:nvSpPr>
+          <p:cNvPr id="2" name="1 Título"/>
+          <p:cNvSpPr>
+            <a:spLocks noGrp="1"/>
+          </p:cNvSpPr>
+          <p:nvPr>
+            <p:ph type="title"/>
+          </p:nvPr>
+        </p:nvSpPr>
+        <p:spPr/>
+        <p:txBody>
+          <a:bodyPr/>
+          <a:lstStyle/>
+          <a:p>
+            <a:r>
+              <a:rPr lang="es-UY" b="1" dirty="0" smtClean="0"/>
+              <a:t>Planificación al cierre</a:t>
+            </a:r>
+            <a:br>
+              <a:rPr lang="es-UY" b="1" dirty="0" smtClean="0"/>
+            </a:br>
+            <a:endParaRPr lang="es-UY" b="1" dirty="0"/>
+          </a:p>
+        </p:txBody>
+      </p:sp>
+      <p:sp>
+        <p:nvSpPr>
+          <p:cNvPr id="3" name="2 Marcador de contenido"/>
+          <p:cNvSpPr>
+            <a:spLocks noGrp="1"/>
+          </p:cNvSpPr>
+          <p:nvPr>
+            <p:ph sz="quarter" idx="1"/>
+          </p:nvPr>
+        </p:nvSpPr>
+        <p:spPr/>
+        <p:txBody>
+          <a:bodyPr>
+            <a:normAutofit lnSpcReduction="10000"/>
+          </a:bodyPr>
+          <a:lstStyle/>
+          <a:p>
+            <a:r>
+              <a:rPr lang="es-UY" sz="2200" dirty="0" smtClean="0"/>
+              <a:t>Integración con STS (2 </a:t>
+            </a:r>
+            <a:r>
+              <a:rPr lang="es-UY" sz="2200" dirty="0" err="1" smtClean="0"/>
+              <a:t>sem</a:t>
+            </a:r>
+            <a:r>
+              <a:rPr lang="es-UY" sz="2200" dirty="0" smtClean="0"/>
+              <a:t>.)</a:t>
+            </a:r>
+          </a:p>
+          <a:p>
+            <a:pPr>
+              <a:buNone/>
+            </a:pPr>
+            <a:endParaRPr lang="es-UY" sz="2200" dirty="0" smtClean="0"/>
+          </a:p>
+          <a:p>
+            <a:r>
+              <a:rPr lang="es-UY" sz="2200" dirty="0" smtClean="0"/>
+              <a:t>Manejo de excepciones (1 </a:t>
+            </a:r>
+            <a:r>
+              <a:rPr lang="es-UY" sz="2200" dirty="0" err="1" smtClean="0"/>
+              <a:t>sem</a:t>
+            </a:r>
+            <a:r>
+              <a:rPr lang="es-UY" sz="2200" dirty="0" smtClean="0"/>
+              <a:t>.)</a:t>
+            </a:r>
+          </a:p>
+          <a:p>
+            <a:endParaRPr lang="es-UY" sz="2200" dirty="0" smtClean="0"/>
+          </a:p>
+          <a:p>
+            <a:r>
+              <a:rPr lang="es-UY" sz="2200" dirty="0" smtClean="0"/>
+              <a:t>Evaluar opciones de asincronismo (1 </a:t>
+            </a:r>
+            <a:r>
+              <a:rPr lang="es-UY" sz="2200" dirty="0" err="1" smtClean="0"/>
+              <a:t>sem</a:t>
+            </a:r>
+            <a:r>
+              <a:rPr lang="es-UY" sz="2200" dirty="0" smtClean="0"/>
+              <a:t>.)</a:t>
+            </a:r>
+          </a:p>
+          <a:p>
+            <a:pPr>
+              <a:buNone/>
+            </a:pPr>
+            <a:endParaRPr lang="es-UY" sz="2200" dirty="0" smtClean="0"/>
+          </a:p>
+          <a:p>
+            <a:r>
+              <a:rPr lang="es-UY" sz="2200" dirty="0" smtClean="0"/>
+              <a:t>Completar prueba de estándares WMS y WFS (2 </a:t>
+            </a:r>
+            <a:r>
+              <a:rPr lang="es-UY" sz="2200" dirty="0" err="1" smtClean="0"/>
+              <a:t>sem</a:t>
+            </a:r>
+            <a:r>
+              <a:rPr lang="es-UY" sz="2200" dirty="0" smtClean="0"/>
+              <a:t>.)</a:t>
+            </a:r>
+          </a:p>
+          <a:p>
+            <a:pPr>
+              <a:buNone/>
+            </a:pPr>
+            <a:endParaRPr lang="es-UY" sz="2200" dirty="0" smtClean="0"/>
+          </a:p>
+          <a:p>
+            <a:r>
+              <a:rPr lang="es-UY" sz="2200" dirty="0" smtClean="0"/>
+              <a:t>Diseñar caso de estudio (1 </a:t>
+            </a:r>
+            <a:r>
+              <a:rPr lang="es-UY" sz="2200" dirty="0" err="1" smtClean="0"/>
+              <a:t>sem</a:t>
+            </a:r>
+            <a:r>
+              <a:rPr lang="es-UY" sz="2200" dirty="0" smtClean="0"/>
+              <a:t>.)</a:t>
+            </a:r>
+          </a:p>
+          <a:p>
+            <a:pPr>
+              <a:buNone/>
+            </a:pPr>
+            <a:endParaRPr lang="es-UY" sz="2200" dirty="0" smtClean="0"/>
+          </a:p>
+          <a:p>
+            <a:r>
+              <a:rPr lang="es-UY" sz="2200" dirty="0" smtClean="0"/>
+              <a:t>Finalizar documento principal (2 </a:t>
+            </a:r>
+            <a:r>
+              <a:rPr lang="es-UY" sz="2200" dirty="0" err="1" smtClean="0"/>
+              <a:t>sem</a:t>
+            </a:r>
+            <a:r>
+              <a:rPr lang="es-UY" sz="2200" dirty="0" smtClean="0"/>
+              <a:t>.)</a:t>
+            </a:r>
+          </a:p>
+          <a:p>
+            <a:endParaRPr lang="es-UY" sz="2200" dirty="0"/>
+          </a:p>
+        </p:txBody>
+      </p:sp>
+    </p:spTree>
+  </p:cSld>
+  <p:clrMapOvr>
+    <a:masterClrMapping/>
+  </p:clrMapOvr>
+  <p:timing>
+    <p:tnLst>
+      <p:par>
+        <p:cTn id="1" dur="indefinite" restart="never" nodeType="tmRoot"/>
+      </p:par>
+    </p:tnLst>
+  </p:timing>
+</p:sld>
+</file>
+
+<file path=ppt/slides/slide21.xml><?xml version="1.0" encoding="utf-8"?>
+<p:sld xmlns:a="http://schemas.openxmlformats.org/drawingml/2006/main" xmlns:r="http://schemas.openxmlformats.org/officeDocument/2006/relationships" xmlns:p="http://schemas.openxmlformats.org/presentationml/2006/main">
+  <p:cSld>
+    <p:spTree>
+      <p:nvGrpSpPr>
+        <p:cNvPr id="1" name=""/>
+        <p:cNvGrpSpPr/>
+        <p:nvPr/>
+      </p:nvGrpSpPr>
+      <p:grpSpPr>
+        <a:xfrm>
+          <a:off x="0" y="0"/>
+          <a:ext cx="0" cy="0"/>
+          <a:chOff x="0" y="0"/>
+          <a:chExt cx="0" cy="0"/>
+        </a:xfrm>
+      </p:grpSpPr>
+      <p:sp>
+        <p:nvSpPr>
           <p:cNvPr id="2" name="Title 1"/>
           <p:cNvSpPr>
             <a:spLocks noGrp="1"/>
@@ -7183,7 +7304,7 @@
 </p:sld>
 </file>
 
-<file path=ppt/slides/slide21.xml><?xml version="1.0" encoding="utf-8"?>
+<file path=ppt/slides/slide22.xml><?xml version="1.0" encoding="utf-8"?>
 <p:sld xmlns:a="http://schemas.openxmlformats.org/drawingml/2006/main" xmlns:r="http://schemas.openxmlformats.org/officeDocument/2006/relationships" xmlns:p="http://schemas.openxmlformats.org/presentationml/2006/main">
   <p:cSld>
     <p:spTree>
@@ -7477,192 +7598,8 @@
             </a:pPr>
             <a:r>
               <a:rPr lang="es-UY" sz="1400" dirty="0" smtClean="0"/>
-              <a:t>OCDE, Organización para la Cooperación y el Desarrollo Económicos</a:t>
-            </a:r>
-          </a:p>
-        </p:txBody>
-      </p:sp>
-      <p:sp>
-        <p:nvSpPr>
-          <p:cNvPr id="7" name="6 Elipse"/>
-          <p:cNvSpPr/>
-          <p:nvPr/>
-        </p:nvSpPr>
-        <p:spPr>
-          <a:xfrm>
-            <a:off x="4086002" y="3614080"/>
-            <a:ext cx="928694" cy="428628"/>
-          </a:xfrm>
-          <a:prstGeom prst="ellipse">
-            <a:avLst/>
-          </a:prstGeom>
-          <a:noFill/>
-          <a:ln>
-            <a:solidFill>
-              <a:srgbClr val="FF0000"/>
-            </a:solidFill>
-          </a:ln>
-        </p:spPr>
-        <p:style>
-          <a:lnRef idx="2">
-            <a:schemeClr val="accent1">
-              <a:shade val="50000"/>
-            </a:schemeClr>
-          </a:lnRef>
-          <a:fillRef idx="1">
-            <a:schemeClr val="accent1"/>
-          </a:fillRef>
-          <a:effectRef idx="0">
-            <a:schemeClr val="accent1"/>
-          </a:effectRef>
-          <a:fontRef idx="minor">
-            <a:schemeClr val="lt1"/>
-          </a:fontRef>
-        </p:style>
-        <p:txBody>
-          <a:bodyPr rtlCol="0" anchor="ctr"/>
-          <a:lstStyle/>
-          <a:p>
-            <a:pPr algn="ctr"/>
-            <a:endParaRPr lang="es-UY"/>
-          </a:p>
-        </p:txBody>
-      </p:sp>
-      <p:sp>
-        <p:nvSpPr>
-          <p:cNvPr id="9" name="8 Elipse"/>
-          <p:cNvSpPr/>
-          <p:nvPr/>
-        </p:nvSpPr>
-        <p:spPr>
-          <a:xfrm>
-            <a:off x="700280" y="3914998"/>
-            <a:ext cx="1143008" cy="357190"/>
-          </a:xfrm>
-          <a:prstGeom prst="ellipse">
-            <a:avLst/>
-          </a:prstGeom>
-          <a:noFill/>
-          <a:ln>
-            <a:solidFill>
-              <a:srgbClr val="FF0000"/>
-            </a:solidFill>
-          </a:ln>
-        </p:spPr>
-        <p:style>
-          <a:lnRef idx="2">
-            <a:schemeClr val="accent1">
-              <a:shade val="50000"/>
-            </a:schemeClr>
-          </a:lnRef>
-          <a:fillRef idx="1">
-            <a:schemeClr val="accent1"/>
-          </a:fillRef>
-          <a:effectRef idx="0">
-            <a:schemeClr val="accent1"/>
-          </a:effectRef>
-          <a:fontRef idx="minor">
-            <a:schemeClr val="lt1"/>
-          </a:fontRef>
-        </p:style>
-        <p:txBody>
-          <a:bodyPr rtlCol="0" anchor="ctr"/>
-          <a:lstStyle/>
-          <a:p>
-            <a:pPr algn="ctr"/>
-            <a:endParaRPr lang="es-UY"/>
-          </a:p>
-        </p:txBody>
-      </p:sp>
-      <p:sp>
-        <p:nvSpPr>
-          <p:cNvPr id="10" name="9 Elipse"/>
-          <p:cNvSpPr/>
-          <p:nvPr/>
-        </p:nvSpPr>
-        <p:spPr>
-          <a:xfrm>
-            <a:off x="6629634" y="4000504"/>
-            <a:ext cx="785818" cy="285752"/>
-          </a:xfrm>
-          <a:prstGeom prst="ellipse">
-            <a:avLst/>
-          </a:prstGeom>
-          <a:noFill/>
-          <a:ln>
-            <a:solidFill>
-              <a:srgbClr val="FF0000"/>
-            </a:solidFill>
-          </a:ln>
-        </p:spPr>
-        <p:style>
-          <a:lnRef idx="2">
-            <a:schemeClr val="accent1">
-              <a:shade val="50000"/>
-            </a:schemeClr>
-          </a:lnRef>
-          <a:fillRef idx="1">
-            <a:schemeClr val="accent1"/>
-          </a:fillRef>
-          <a:effectRef idx="0">
-            <a:schemeClr val="accent1"/>
-          </a:effectRef>
-          <a:fontRef idx="minor">
-            <a:schemeClr val="lt1"/>
-          </a:fontRef>
-        </p:style>
-        <p:txBody>
-          <a:bodyPr rtlCol="0" anchor="ctr"/>
-          <a:lstStyle/>
-          <a:p>
-            <a:pPr algn="ctr"/>
-            <a:endParaRPr lang="es-UY"/>
-          </a:p>
-        </p:txBody>
-      </p:sp>
-      <p:sp>
-        <p:nvSpPr>
-          <p:cNvPr id="11" name="10 Elipse"/>
-          <p:cNvSpPr/>
-          <p:nvPr/>
-        </p:nvSpPr>
-        <p:spPr>
-          <a:xfrm>
-            <a:off x="728416" y="4272188"/>
-            <a:ext cx="1143008" cy="357190"/>
-          </a:xfrm>
-          <a:prstGeom prst="ellipse">
-            <a:avLst/>
-          </a:prstGeom>
-          <a:noFill/>
-          <a:ln>
-            <a:solidFill>
-              <a:srgbClr val="FF0000"/>
-            </a:solidFill>
-          </a:ln>
-        </p:spPr>
-        <p:style>
-          <a:lnRef idx="2">
-            <a:schemeClr val="accent1">
-              <a:shade val="50000"/>
-            </a:schemeClr>
-          </a:lnRef>
-          <a:fillRef idx="1">
-            <a:schemeClr val="accent1"/>
-          </a:fillRef>
-          <a:effectRef idx="0">
-            <a:schemeClr val="accent1"/>
-          </a:effectRef>
-          <a:fontRef idx="minor">
-            <a:schemeClr val="lt1"/>
-          </a:fontRef>
-        </p:style>
-        <p:txBody>
-          <a:bodyPr rtlCol="0" anchor="ctr"/>
-          <a:lstStyle/>
-          <a:p>
-            <a:pPr algn="ctr"/>
-            <a:endParaRPr lang="es-UY"/>
+              <a:t>OCDE, Organización para la Cooperación y el Desarrollo Económico</a:t>
+            </a:r>
           </a:p>
         </p:txBody>
       </p:sp>
@@ -7915,6 +7852,14 @@
           </a:p>
           <a:p>
             <a:r>
+              <a:rPr lang="es-UY" sz="2200" dirty="0" smtClean="0">
+                <a:solidFill>
+                  <a:srgbClr val="FF0000"/>
+                </a:solidFill>
+              </a:rPr>
+              <a:t>El </a:t>
+            </a:r>
+            <a:r>
               <a:rPr lang="es-UY" sz="2200" dirty="0" smtClean="0"/>
               <a:t>OGC (Open </a:t>
             </a:r>
@@ -7963,6 +7908,27 @@
               <a:rPr lang="es-UY" sz="2000" dirty="0" smtClean="0"/>
               <a:t> (WMS) </a:t>
             </a:r>
+            <a:r>
+              <a:rPr lang="es-UY" sz="2000" dirty="0" smtClean="0">
+                <a:solidFill>
+                  <a:srgbClr val="FF0000"/>
+                </a:solidFill>
+              </a:rPr>
+              <a:t>algunos, estilo </a:t>
+            </a:r>
+            <a:r>
+              <a:rPr lang="es-UY" sz="2000" dirty="0" err="1" smtClean="0">
+                <a:solidFill>
+                  <a:srgbClr val="FF0000"/>
+                </a:solidFill>
+              </a:rPr>
+              <a:t>rest</a:t>
+            </a:r>
+            <a:endParaRPr lang="es-UY" sz="2000" dirty="0" smtClean="0">
+              <a:solidFill>
+                <a:srgbClr val="FF0000"/>
+              </a:solidFill>
+            </a:endParaRPr>
           </a:p>
           <a:p>
             <a:pPr lvl="2"/>
@@ -8151,11 +8117,7 @@
             <a:pPr lvl="1"/>
             <a:r>
               <a:rPr lang="es-UY" sz="2000" dirty="0" smtClean="0"/>
-              <a:t>Integración de Servicios Geográficos en Plataformas de Gobierno </a:t>
-            </a:r>
-            <a:r>
-              <a:rPr lang="es-UY" sz="2000" dirty="0" smtClean="0"/>
-              <a:t>Electrónico</a:t>
+              <a:t>Integración de Servicios Geográficos en Plataformas de Gobierno Electrónico</a:t>
             </a:r>
           </a:p>
           <a:p>
@@ -8177,11 +8139,7 @@
             <a:pPr lvl="3"/>
             <a:r>
               <a:rPr lang="es-UY" sz="1600" dirty="0" smtClean="0"/>
-              <a:t>Estándares </a:t>
-            </a:r>
-            <a:r>
-              <a:rPr lang="es-UY" sz="1600" dirty="0" smtClean="0"/>
-              <a:t>WMS y WFS definidos para REST</a:t>
+              <a:t>Estándares WMS y WFS definidos para REST</a:t>
             </a:r>
           </a:p>
           <a:p>
@@ -8428,6 +8386,35 @@
             <a:pPr>
               <a:buNone/>
             </a:pPr>
+            <a:r>
+              <a:rPr lang="es-UY" sz="2200" dirty="0" smtClean="0"/>
+              <a:t>Mostrar arquitectura gis, que existen clientes gis y que no se pueden modificar</a:t>
+            </a:r>
+          </a:p>
+          <a:p>
+            <a:pPr>
+              <a:buNone/>
+            </a:pPr>
+            <a:r>
+              <a:rPr lang="es-UY" sz="2200" dirty="0" smtClean="0"/>
+              <a:t>Productos que cumplen con </a:t>
+            </a:r>
+            <a:r>
+              <a:rPr lang="es-UY" sz="2200" smtClean="0"/>
+              <a:t>los estándares </a:t>
+            </a:r>
+            <a:r>
+              <a:rPr lang="es-UY" sz="2200" dirty="0" err="1" smtClean="0"/>
+              <a:t>wms</a:t>
+            </a:r>
+            <a:r>
+              <a:rPr lang="es-UY" sz="2200" dirty="0" smtClean="0"/>
+              <a:t> y </a:t>
+            </a:r>
+            <a:r>
+              <a:rPr lang="es-UY" sz="2200" dirty="0" err="1" smtClean="0"/>
+              <a:t>wfs</a:t>
+            </a:r>
             <a:endParaRPr lang="es-UY" sz="2200" dirty="0" smtClean="0"/>
           </a:p>
           <a:p>
@@ -8440,14 +8427,14 @@
             <a:pPr lvl="1"/>
             <a:r>
               <a:rPr lang="es-UY" sz="2000" dirty="0" smtClean="0"/>
-              <a:t>WMS</a:t>
+              <a:t>WMS: agregar métodos</a:t>
             </a:r>
           </a:p>
           <a:p>
             <a:pPr lvl="1"/>
             <a:r>
               <a:rPr lang="es-UY" sz="2000" dirty="0" smtClean="0"/>
-              <a:t>WFS</a:t>
+              <a:t>WFS: agregar métodos</a:t>
             </a:r>
           </a:p>
           <a:p>
@@ -8491,15 +8478,10 @@
             </a:r>
           </a:p>
           <a:p>
-            <a:pPr lvl="1"/>
+            <a:pPr lvl="1">
+              <a:buNone/>
+            </a:pPr>
             <a:endParaRPr lang="es-UY" sz="2200" dirty="0" smtClean="0"/>
-          </a:p>
-          <a:p>
-            <a:r>
-              <a:rPr lang="es-UY" sz="2200" dirty="0" smtClean="0"/>
-              <a:t>PGE</a:t>
-            </a:r>
-            <a:endParaRPr lang="es-UY" sz="2200" dirty="0"/>
           </a:p>
         </p:txBody>
       </p:sp>

</xml_diff>